<commit_message>
updated block diagram Proj 1
</commit_message>
<xml_diff>
--- a/Poker Dealer Robot Project/Lloyd_ENGI301_project_01_proposal.pptx
+++ b/Poker Dealer Robot Project/Lloyd_ENGI301_project_01_proposal.pptx
@@ -221,7 +221,7 @@
           <a:p>
             <a:fld id="{59041DB8-B66F-4DC8-A96E-33677E0F90FF}" type="datetimeFigureOut">
               <a:rPr lang="en-US" smtClean="0"/>
-              <a:t>10/5/2022</a:t>
+              <a:t>12/12/22</a:t>
             </a:fld>
             <a:endParaRPr lang="en-US"/>
           </a:p>
@@ -386,7 +386,7 @@
           <a:p>
             <a:fld id="{DEB49C4A-65AC-492D-9701-81B46C3AD0E4}" type="datetimeFigureOut">
               <a:rPr lang="en-US" smtClean="0"/>
-              <a:t>10/5/2022</a:t>
+              <a:t>12/12/22</a:t>
             </a:fld>
             <a:endParaRPr lang="en-US"/>
           </a:p>
@@ -2794,7 +2794,7 @@
           <a:p>
             <a:fld id="{384A29A4-78C8-47AB-BA06-22CB45938951}" type="datetime1">
               <a:rPr lang="en-US" smtClean="0"/>
-              <a:t>10/5/2022</a:t>
+              <a:t>12/12/22</a:t>
             </a:fld>
             <a:endParaRPr lang="en-US"/>
           </a:p>
@@ -2989,7 +2989,7 @@
           <a:p>
             <a:fld id="{E1ED4ACF-2D82-46F2-A8E9-23963AA34E86}" type="datetime1">
               <a:rPr lang="en-US" smtClean="0"/>
-              <a:t>10/5/2022</a:t>
+              <a:t>12/12/22</a:t>
             </a:fld>
             <a:endParaRPr lang="en-US"/>
           </a:p>
@@ -3183,7 +3183,7 @@
           <a:p>
             <a:fld id="{AE374B5B-21A0-4192-BF4C-38187F1A68D8}" type="datetime1">
               <a:rPr lang="en-US" smtClean="0"/>
-              <a:t>10/5/2022</a:t>
+              <a:t>12/12/22</a:t>
             </a:fld>
             <a:endParaRPr lang="en-US"/>
           </a:p>
@@ -5524,7 +5524,7 @@
           <a:p>
             <a:fld id="{33B5CF7C-B333-48E1-A4A6-83A3C8B73AC0}" type="datetime1">
               <a:rPr lang="en-US" smtClean="0"/>
-              <a:t>10/5/2022</a:t>
+              <a:t>12/12/22</a:t>
             </a:fld>
             <a:endParaRPr lang="en-US"/>
           </a:p>
@@ -5977,7 +5977,7 @@
           <a:p>
             <a:fld id="{AE320762-5CBF-4210-AB54-376B091119F8}" type="datetime1">
               <a:rPr lang="en-US" smtClean="0"/>
-              <a:t>10/5/2022</a:t>
+              <a:t>12/12/22</a:t>
             </a:fld>
             <a:endParaRPr lang="en-US"/>
           </a:p>
@@ -6109,7 +6109,7 @@
           <a:p>
             <a:fld id="{7F0DB371-BF5F-4058-A212-1A908E4D2674}" type="datetime1">
               <a:rPr lang="en-US" smtClean="0"/>
-              <a:t>10/5/2022</a:t>
+              <a:t>12/12/22</a:t>
             </a:fld>
             <a:endParaRPr lang="en-US"/>
           </a:p>
@@ -8042,7 +8042,7 @@
           <a:p>
             <a:fld id="{60A4083B-90AA-48CF-BAD5-00AA24D7F288}" type="datetime1">
               <a:rPr lang="en-US" smtClean="0"/>
-              <a:t>10/5/2022</a:t>
+              <a:t>12/12/22</a:t>
             </a:fld>
             <a:endParaRPr lang="en-US"/>
           </a:p>
@@ -10301,7 +10301,7 @@
             <a:fld id="{F5BAF629-ECA2-4CF3-B790-9D9BDED98269}" type="datetime1">
               <a:rPr lang="en-US" smtClean="0"/>
               <a:pPr/>
-              <a:t>10/5/2022</a:t>
+              <a:t>12/12/22</a:t>
             </a:fld>
             <a:endParaRPr lang="en-US"/>
           </a:p>
@@ -14596,7 +14596,7 @@
             <a:fld id="{B51B2453-8663-4C69-AF73-9FD7B1DEC5D0}" type="datetime1">
               <a:rPr lang="en-US" smtClean="0"/>
               <a:pPr/>
-              <a:t>10/5/2022</a:t>
+              <a:t>12/12/22</a:t>
             </a:fld>
             <a:endParaRPr lang="en-US" dirty="0"/>
           </a:p>
@@ -15614,37 +15614,6 @@
       </p:sp>
       <p:sp>
         <p:nvSpPr>
-          <p:cNvPr id="3" name="Content Placeholder 2">
-            <a:extLst>
-              <a:ext uri="{FF2B5EF4-FFF2-40B4-BE49-F238E27FC236}">
-                <a16:creationId xmlns:a16="http://schemas.microsoft.com/office/drawing/2014/main" id="{39FC9173-ADDE-4A3D-BDB4-3F990F1032E5}"/>
-              </a:ext>
-            </a:extLst>
-          </p:cNvPr>
-          <p:cNvSpPr>
-            <a:spLocks noGrp="1"/>
-          </p:cNvSpPr>
-          <p:nvPr>
-            <p:ph idx="1"/>
-          </p:nvPr>
-        </p:nvSpPr>
-        <p:spPr/>
-        <p:txBody>
-          <a:bodyPr/>
-          <a:lstStyle/>
-          <a:p>
-            <a:r>
-              <a:rPr lang="en-US" dirty="0"/>
-              <a:t>Uncertain about which models/types of components I will need. Would like to discuss further at project meeting for specific recommendations</a:t>
-            </a:r>
-          </a:p>
-          <a:p>
-            <a:endParaRPr lang="en-US" dirty="0"/>
-          </a:p>
-        </p:txBody>
-      </p:sp>
-      <p:sp>
-        <p:nvSpPr>
           <p:cNvPr id="5" name="TextBox 4">
             <a:extLst>
               <a:ext uri="{FF2B5EF4-FFF2-40B4-BE49-F238E27FC236}">
@@ -15684,10 +15653,10 @@
       </p:sp>
       <p:pic>
         <p:nvPicPr>
-          <p:cNvPr id="7" name="Picture 6">
+          <p:cNvPr id="4" name="Picture 3">
             <a:extLst>
               <a:ext uri="{FF2B5EF4-FFF2-40B4-BE49-F238E27FC236}">
-                <a16:creationId xmlns:a16="http://schemas.microsoft.com/office/drawing/2014/main" id="{DBE03B8E-6383-C27C-A3CB-57CB90CC59A3}"/>
+                <a16:creationId xmlns:a16="http://schemas.microsoft.com/office/drawing/2014/main" id="{1BDF981F-4E39-CD83-825F-050967B719DF}"/>
               </a:ext>
             </a:extLst>
           </p:cNvPr>
@@ -15704,14 +15673,39 @@
         </p:blipFill>
         <p:spPr>
           <a:xfrm>
-            <a:off x="2438400" y="1842951"/>
-            <a:ext cx="7772400" cy="4791892"/>
+            <a:off x="2209800" y="1068457"/>
+            <a:ext cx="7772400" cy="4721086"/>
           </a:xfrm>
           <a:prstGeom prst="rect">
             <a:avLst/>
           </a:prstGeom>
         </p:spPr>
       </p:pic>
+      <p:sp>
+        <p:nvSpPr>
+          <p:cNvPr id="8" name="Content Placeholder 7">
+            <a:extLst>
+              <a:ext uri="{FF2B5EF4-FFF2-40B4-BE49-F238E27FC236}">
+                <a16:creationId xmlns:a16="http://schemas.microsoft.com/office/drawing/2014/main" id="{882E2E90-98BB-9FEB-81BC-935F01D1A9E4}"/>
+              </a:ext>
+            </a:extLst>
+          </p:cNvPr>
+          <p:cNvSpPr>
+            <a:spLocks noGrp="1"/>
+          </p:cNvSpPr>
+          <p:nvPr>
+            <p:ph idx="1"/>
+          </p:nvPr>
+        </p:nvSpPr>
+        <p:spPr/>
+        <p:txBody>
+          <a:bodyPr/>
+          <a:lstStyle/>
+          <a:p>
+            <a:endParaRPr lang="en-US" dirty="0"/>
+          </a:p>
+        </p:txBody>
+      </p:sp>
     </p:spTree>
     <p:extLst>
       <p:ext uri="{BB962C8B-B14F-4D97-AF65-F5344CB8AC3E}">

</xml_diff>